<commit_message>
feat: change resolution and card size in png export
</commit_message>
<xml_diff>
--- a/doc/DCG.pptx
+++ b/doc/DCG.pptx
@@ -5,10 +5,11 @@
     <p:sldMasterId id="2147483648" r:id="rId1"/>
   </p:sldMasterIdLst>
   <p:notesMasterIdLst>
-    <p:notesMasterId r:id="rId3"/>
+    <p:notesMasterId r:id="rId4"/>
   </p:notesMasterIdLst>
   <p:sldIdLst>
     <p:sldId id="256" r:id="rId2"/>
+    <p:sldId id="257" r:id="rId3"/>
   </p:sldIdLst>
   <p:sldSz cx="9144000" cy="6858000" type="screen4x3"/>
   <p:notesSz cx="6858000" cy="9144000"/>
@@ -192,7 +193,7 @@
           <a:p>
             <a:fld id="{1C127075-C14B-40A4-B712-C37EF82237B7}" type="datetimeFigureOut">
               <a:rPr lang="fr-FR" smtClean="0"/>
-              <a:t>17/04/2017</a:t>
+              <a:t>24/05/2017</a:t>
             </a:fld>
             <a:endParaRPr lang="fr-FR"/>
           </a:p>
@@ -725,7 +726,7 @@
           <a:p>
             <a:fld id="{F133F15D-4772-4F92-A78B-779C7D721DD8}" type="datetimeFigureOut">
               <a:rPr lang="fr-FR" smtClean="0"/>
-              <a:t>17/04/2017</a:t>
+              <a:t>24/05/2017</a:t>
             </a:fld>
             <a:endParaRPr lang="fr-FR"/>
           </a:p>
@@ -895,7 +896,7 @@
           <a:p>
             <a:fld id="{F133F15D-4772-4F92-A78B-779C7D721DD8}" type="datetimeFigureOut">
               <a:rPr lang="fr-FR" smtClean="0"/>
-              <a:t>17/04/2017</a:t>
+              <a:t>24/05/2017</a:t>
             </a:fld>
             <a:endParaRPr lang="fr-FR"/>
           </a:p>
@@ -1075,7 +1076,7 @@
           <a:p>
             <a:fld id="{F133F15D-4772-4F92-A78B-779C7D721DD8}" type="datetimeFigureOut">
               <a:rPr lang="fr-FR" smtClean="0"/>
-              <a:t>17/04/2017</a:t>
+              <a:t>24/05/2017</a:t>
             </a:fld>
             <a:endParaRPr lang="fr-FR"/>
           </a:p>
@@ -1245,7 +1246,7 @@
           <a:p>
             <a:fld id="{F133F15D-4772-4F92-A78B-779C7D721DD8}" type="datetimeFigureOut">
               <a:rPr lang="fr-FR" smtClean="0"/>
-              <a:t>17/04/2017</a:t>
+              <a:t>24/05/2017</a:t>
             </a:fld>
             <a:endParaRPr lang="fr-FR"/>
           </a:p>
@@ -1491,7 +1492,7 @@
           <a:p>
             <a:fld id="{F133F15D-4772-4F92-A78B-779C7D721DD8}" type="datetimeFigureOut">
               <a:rPr lang="fr-FR" smtClean="0"/>
-              <a:t>17/04/2017</a:t>
+              <a:t>24/05/2017</a:t>
             </a:fld>
             <a:endParaRPr lang="fr-FR"/>
           </a:p>
@@ -1779,7 +1780,7 @@
           <a:p>
             <a:fld id="{F133F15D-4772-4F92-A78B-779C7D721DD8}" type="datetimeFigureOut">
               <a:rPr lang="fr-FR" smtClean="0"/>
-              <a:t>17/04/2017</a:t>
+              <a:t>24/05/2017</a:t>
             </a:fld>
             <a:endParaRPr lang="fr-FR"/>
           </a:p>
@@ -2201,7 +2202,7 @@
           <a:p>
             <a:fld id="{F133F15D-4772-4F92-A78B-779C7D721DD8}" type="datetimeFigureOut">
               <a:rPr lang="fr-FR" smtClean="0"/>
-              <a:t>17/04/2017</a:t>
+              <a:t>24/05/2017</a:t>
             </a:fld>
             <a:endParaRPr lang="fr-FR"/>
           </a:p>
@@ -2319,7 +2320,7 @@
           <a:p>
             <a:fld id="{F133F15D-4772-4F92-A78B-779C7D721DD8}" type="datetimeFigureOut">
               <a:rPr lang="fr-FR" smtClean="0"/>
-              <a:t>17/04/2017</a:t>
+              <a:t>24/05/2017</a:t>
             </a:fld>
             <a:endParaRPr lang="fr-FR"/>
           </a:p>
@@ -2414,7 +2415,7 @@
           <a:p>
             <a:fld id="{F133F15D-4772-4F92-A78B-779C7D721DD8}" type="datetimeFigureOut">
               <a:rPr lang="fr-FR" smtClean="0"/>
-              <a:t>17/04/2017</a:t>
+              <a:t>24/05/2017</a:t>
             </a:fld>
             <a:endParaRPr lang="fr-FR"/>
           </a:p>
@@ -2691,7 +2692,7 @@
           <a:p>
             <a:fld id="{F133F15D-4772-4F92-A78B-779C7D721DD8}" type="datetimeFigureOut">
               <a:rPr lang="fr-FR" smtClean="0"/>
-              <a:t>17/04/2017</a:t>
+              <a:t>24/05/2017</a:t>
             </a:fld>
             <a:endParaRPr lang="fr-FR"/>
           </a:p>
@@ -2944,7 +2945,7 @@
           <a:p>
             <a:fld id="{F133F15D-4772-4F92-A78B-779C7D721DD8}" type="datetimeFigureOut">
               <a:rPr lang="fr-FR" smtClean="0"/>
-              <a:t>17/04/2017</a:t>
+              <a:t>24/05/2017</a:t>
             </a:fld>
             <a:endParaRPr lang="fr-FR"/>
           </a:p>
@@ -3157,7 +3158,7 @@
           <a:p>
             <a:fld id="{F133F15D-4772-4F92-A78B-779C7D721DD8}" type="datetimeFigureOut">
               <a:rPr lang="fr-FR" smtClean="0"/>
-              <a:t>17/04/2017</a:t>
+              <a:t>24/05/2017</a:t>
             </a:fld>
             <a:endParaRPr lang="fr-FR"/>
           </a:p>
@@ -3658,7 +3659,7 @@
         </p:nvSpPr>
         <p:spPr>
           <a:xfrm>
-            <a:off x="5550812" y="1638446"/>
+            <a:off x="7500049" y="2546972"/>
             <a:ext cx="1440160" cy="648072"/>
           </a:xfrm>
           <a:prstGeom prst="rect">
@@ -3717,7 +3718,7 @@
         </p:nvSpPr>
         <p:spPr>
           <a:xfrm>
-            <a:off x="5550812" y="5015224"/>
+            <a:off x="3985351" y="626800"/>
             <a:ext cx="1440160" cy="648072"/>
           </a:xfrm>
           <a:prstGeom prst="rect">
@@ -3776,7 +3777,7 @@
         </p:nvSpPr>
         <p:spPr>
           <a:xfrm>
-            <a:off x="642376" y="2286518"/>
+            <a:off x="3563179" y="1836966"/>
             <a:ext cx="1440160" cy="648071"/>
           </a:xfrm>
           <a:prstGeom prst="rect">
@@ -3838,7 +3839,7 @@
         </p:nvSpPr>
         <p:spPr>
           <a:xfrm>
-            <a:off x="5550812" y="2886275"/>
+            <a:off x="4427984" y="3371169"/>
             <a:ext cx="1440160" cy="648072"/>
           </a:xfrm>
           <a:prstGeom prst="rect">
@@ -3883,7 +3884,14 @@
             <a:pPr algn="ctr"/>
             <a:r>
               <a:rPr lang="fr-FR" dirty="0" smtClean="0"/>
-              <a:t>PICTURE BUILDER</a:t>
+              <a:t>IMAGE</a:t>
+            </a:r>
+          </a:p>
+          <a:p>
+            <a:pPr algn="ctr"/>
+            <a:r>
+              <a:rPr lang="fr-FR" dirty="0" smtClean="0"/>
+              <a:t>BUILDER</a:t>
             </a:r>
             <a:endParaRPr lang="fr-FR" dirty="0"/>
           </a:p>
@@ -3891,14 +3899,476 @@
       </p:sp>
       <p:sp>
         <p:nvSpPr>
-          <p:cNvPr id="11" name="ZoneTexte 10"/>
+          <p:cNvPr id="13" name="ZoneTexte 12"/>
           <p:cNvSpPr txBox="1"/>
           <p:nvPr/>
         </p:nvSpPr>
         <p:spPr>
           <a:xfrm>
-            <a:off x="3101158" y="3060309"/>
+            <a:off x="365677" y="2288604"/>
             <a:ext cx="1440160" cy="648071"/>
+          </a:xfrm>
+          <a:prstGeom prst="rect">
+            <a:avLst/>
+          </a:prstGeom>
+          <a:gradFill>
+            <a:gsLst>
+              <a:gs pos="0">
+                <a:schemeClr val="bg2">
+                  <a:lumMod val="75000"/>
+                </a:schemeClr>
+              </a:gs>
+              <a:gs pos="50000">
+                <a:schemeClr val="bg2">
+                  <a:lumMod val="90000"/>
+                </a:schemeClr>
+              </a:gs>
+              <a:gs pos="100000">
+                <a:schemeClr val="bg2">
+                  <a:lumMod val="75000"/>
+                </a:schemeClr>
+              </a:gs>
+            </a:gsLst>
+            <a:lin ang="5400000" scaled="0"/>
+          </a:gradFill>
+          <a:ln>
+            <a:solidFill>
+              <a:schemeClr val="accent1"/>
+            </a:solidFill>
+          </a:ln>
+          <a:effectLst>
+            <a:outerShdw blurRad="50800" dist="38100" dir="2700000" algn="tl" rotWithShape="0">
+              <a:prstClr val="black">
+                <a:alpha val="40000"/>
+              </a:prstClr>
+            </a:outerShdw>
+          </a:effectLst>
+        </p:spPr>
+        <p:txBody>
+          <a:bodyPr wrap="square" rtlCol="0" anchor="ctr" anchorCtr="1">
+            <a:noAutofit/>
+          </a:bodyPr>
+          <a:lstStyle/>
+          <a:p>
+            <a:pPr algn="ctr"/>
+            <a:r>
+              <a:rPr lang="fr-FR" dirty="0" smtClean="0"/>
+              <a:t>STAT</a:t>
+            </a:r>
+            <a:endParaRPr lang="fr-FR" dirty="0"/>
+          </a:p>
+        </p:txBody>
+      </p:sp>
+      <p:sp>
+        <p:nvSpPr>
+          <p:cNvPr id="14" name="ZoneTexte 13"/>
+          <p:cNvSpPr txBox="1"/>
+          <p:nvPr/>
+        </p:nvSpPr>
+        <p:spPr>
+          <a:xfrm>
+            <a:off x="5868144" y="4937905"/>
+            <a:ext cx="1440160" cy="648071"/>
+          </a:xfrm>
+          <a:prstGeom prst="rect">
+            <a:avLst/>
+          </a:prstGeom>
+          <a:gradFill>
+            <a:gsLst>
+              <a:gs pos="0">
+                <a:schemeClr val="bg2">
+                  <a:lumMod val="75000"/>
+                </a:schemeClr>
+              </a:gs>
+              <a:gs pos="50000">
+                <a:schemeClr val="bg2">
+                  <a:lumMod val="90000"/>
+                </a:schemeClr>
+              </a:gs>
+              <a:gs pos="100000">
+                <a:schemeClr val="bg2">
+                  <a:lumMod val="75000"/>
+                </a:schemeClr>
+              </a:gs>
+            </a:gsLst>
+            <a:lin ang="5400000" scaled="0"/>
+          </a:gradFill>
+          <a:ln>
+            <a:solidFill>
+              <a:schemeClr val="accent1"/>
+            </a:solidFill>
+          </a:ln>
+          <a:effectLst>
+            <a:outerShdw blurRad="50800" dist="38100" dir="2700000" algn="tl" rotWithShape="0">
+              <a:prstClr val="black">
+                <a:alpha val="40000"/>
+              </a:prstClr>
+            </a:outerShdw>
+          </a:effectLst>
+        </p:spPr>
+        <p:txBody>
+          <a:bodyPr wrap="square" rtlCol="0" anchor="ctr" anchorCtr="1">
+            <a:noAutofit/>
+          </a:bodyPr>
+          <a:lstStyle/>
+          <a:p>
+            <a:pPr algn="ctr"/>
+            <a:r>
+              <a:rPr lang="fr-FR" dirty="0" smtClean="0"/>
+              <a:t>MANAGER</a:t>
+            </a:r>
+            <a:endParaRPr lang="fr-FR" dirty="0"/>
+          </a:p>
+        </p:txBody>
+      </p:sp>
+      <p:cxnSp>
+        <p:nvCxnSpPr>
+          <p:cNvPr id="16" name="Connecteur droit avec flèche 15"/>
+          <p:cNvCxnSpPr>
+            <a:stCxn id="6" idx="3"/>
+            <a:endCxn id="14" idx="0"/>
+          </p:cNvCxnSpPr>
+          <p:nvPr/>
+        </p:nvCxnSpPr>
+        <p:spPr>
+          <a:xfrm>
+            <a:off x="5425511" y="950836"/>
+            <a:ext cx="1162713" cy="3987069"/>
+          </a:xfrm>
+          <a:prstGeom prst="curvedConnector2">
+            <a:avLst/>
+          </a:prstGeom>
+          <a:ln w="12700">
+            <a:solidFill>
+              <a:schemeClr val="tx1"/>
+            </a:solidFill>
+            <a:tailEnd type="arrow"/>
+          </a:ln>
+        </p:spPr>
+        <p:style>
+          <a:lnRef idx="1">
+            <a:schemeClr val="accent1"/>
+          </a:lnRef>
+          <a:fillRef idx="0">
+            <a:schemeClr val="accent1"/>
+          </a:fillRef>
+          <a:effectRef idx="0">
+            <a:schemeClr val="accent1"/>
+          </a:effectRef>
+          <a:fontRef idx="minor">
+            <a:schemeClr val="tx1"/>
+          </a:fontRef>
+        </p:style>
+      </p:cxnSp>
+      <p:cxnSp>
+        <p:nvCxnSpPr>
+          <p:cNvPr id="17" name="Connecteur droit avec flèche 16"/>
+          <p:cNvCxnSpPr>
+            <a:stCxn id="9" idx="3"/>
+            <a:endCxn id="14" idx="0"/>
+          </p:cNvCxnSpPr>
+          <p:nvPr/>
+        </p:nvCxnSpPr>
+        <p:spPr>
+          <a:xfrm>
+            <a:off x="5868144" y="3695205"/>
+            <a:ext cx="720080" cy="1242700"/>
+          </a:xfrm>
+          <a:prstGeom prst="curvedConnector2">
+            <a:avLst/>
+          </a:prstGeom>
+          <a:ln w="12700">
+            <a:solidFill>
+              <a:schemeClr val="tx1"/>
+            </a:solidFill>
+            <a:tailEnd type="arrow"/>
+          </a:ln>
+        </p:spPr>
+        <p:style>
+          <a:lnRef idx="1">
+            <a:schemeClr val="accent1"/>
+          </a:lnRef>
+          <a:fillRef idx="0">
+            <a:schemeClr val="accent1"/>
+          </a:fillRef>
+          <a:effectRef idx="0">
+            <a:schemeClr val="accent1"/>
+          </a:effectRef>
+          <a:fontRef idx="minor">
+            <a:schemeClr val="tx1"/>
+          </a:fontRef>
+        </p:style>
+      </p:cxnSp>
+      <p:cxnSp>
+        <p:nvCxnSpPr>
+          <p:cNvPr id="22" name="Connecteur droit avec flèche 21"/>
+          <p:cNvCxnSpPr>
+            <a:stCxn id="9" idx="1"/>
+            <a:endCxn id="7" idx="2"/>
+          </p:cNvCxnSpPr>
+          <p:nvPr/>
+        </p:nvCxnSpPr>
+        <p:spPr>
+          <a:xfrm rot="10800000">
+            <a:off x="4283260" y="2485037"/>
+            <a:ext cx="144725" cy="1210168"/>
+          </a:xfrm>
+          <a:prstGeom prst="curvedConnector2">
+            <a:avLst/>
+          </a:prstGeom>
+          <a:ln w="12700">
+            <a:solidFill>
+              <a:schemeClr val="tx1"/>
+            </a:solidFill>
+            <a:tailEnd type="arrow"/>
+          </a:ln>
+        </p:spPr>
+        <p:style>
+          <a:lnRef idx="1">
+            <a:schemeClr val="accent1"/>
+          </a:lnRef>
+          <a:fillRef idx="0">
+            <a:schemeClr val="accent1"/>
+          </a:fillRef>
+          <a:effectRef idx="0">
+            <a:schemeClr val="accent1"/>
+          </a:effectRef>
+          <a:fontRef idx="minor">
+            <a:schemeClr val="tx1"/>
+          </a:fontRef>
+        </p:style>
+      </p:cxnSp>
+      <p:cxnSp>
+        <p:nvCxnSpPr>
+          <p:cNvPr id="30" name="Connecteur droit avec flèche 29"/>
+          <p:cNvCxnSpPr>
+            <a:stCxn id="5" idx="1"/>
+            <a:endCxn id="9" idx="0"/>
+          </p:cNvCxnSpPr>
+          <p:nvPr/>
+        </p:nvCxnSpPr>
+        <p:spPr>
+          <a:xfrm rot="10800000" flipV="1">
+            <a:off x="5148065" y="2871007"/>
+            <a:ext cx="2351985" cy="500161"/>
+          </a:xfrm>
+          <a:prstGeom prst="curvedConnector2">
+            <a:avLst/>
+          </a:prstGeom>
+          <a:ln w="12700">
+            <a:solidFill>
+              <a:schemeClr val="tx1"/>
+            </a:solidFill>
+            <a:tailEnd type="arrow"/>
+          </a:ln>
+        </p:spPr>
+        <p:style>
+          <a:lnRef idx="1">
+            <a:schemeClr val="accent1"/>
+          </a:lnRef>
+          <a:fillRef idx="0">
+            <a:schemeClr val="accent1"/>
+          </a:fillRef>
+          <a:effectRef idx="0">
+            <a:schemeClr val="accent1"/>
+          </a:effectRef>
+          <a:fontRef idx="minor">
+            <a:schemeClr val="tx1"/>
+          </a:fontRef>
+        </p:style>
+      </p:cxnSp>
+      <p:cxnSp>
+        <p:nvCxnSpPr>
+          <p:cNvPr id="33" name="Connecteur droit avec flèche 32"/>
+          <p:cNvCxnSpPr>
+            <a:stCxn id="6" idx="3"/>
+            <a:endCxn id="9" idx="0"/>
+          </p:cNvCxnSpPr>
+          <p:nvPr/>
+        </p:nvCxnSpPr>
+        <p:spPr>
+          <a:xfrm flipH="1">
+            <a:off x="5148064" y="950836"/>
+            <a:ext cx="277447" cy="2420333"/>
+          </a:xfrm>
+          <a:prstGeom prst="curvedConnector4">
+            <a:avLst>
+              <a:gd name="adj1" fmla="val -82394"/>
+              <a:gd name="adj2" fmla="val 56694"/>
+            </a:avLst>
+          </a:prstGeom>
+          <a:ln w="12700">
+            <a:solidFill>
+              <a:schemeClr val="tx1"/>
+            </a:solidFill>
+            <a:tailEnd type="arrow"/>
+          </a:ln>
+        </p:spPr>
+        <p:style>
+          <a:lnRef idx="1">
+            <a:schemeClr val="accent1"/>
+          </a:lnRef>
+          <a:fillRef idx="0">
+            <a:schemeClr val="accent1"/>
+          </a:fillRef>
+          <a:effectRef idx="0">
+            <a:schemeClr val="accent1"/>
+          </a:effectRef>
+          <a:fontRef idx="minor">
+            <a:schemeClr val="tx1"/>
+          </a:fontRef>
+        </p:style>
+      </p:cxnSp>
+      <p:cxnSp>
+        <p:nvCxnSpPr>
+          <p:cNvPr id="36" name="Connecteur droit avec flèche 35"/>
+          <p:cNvCxnSpPr>
+            <a:stCxn id="9" idx="1"/>
+            <a:endCxn id="31" idx="0"/>
+          </p:cNvCxnSpPr>
+          <p:nvPr/>
+        </p:nvCxnSpPr>
+        <p:spPr>
+          <a:xfrm rot="10800000" flipV="1">
+            <a:off x="2874758" y="3695204"/>
+            <a:ext cx="1553227" cy="492655"/>
+          </a:xfrm>
+          <a:prstGeom prst="curvedConnector2">
+            <a:avLst/>
+          </a:prstGeom>
+          <a:ln w="12700">
+            <a:solidFill>
+              <a:schemeClr val="tx1"/>
+            </a:solidFill>
+            <a:tailEnd type="arrow"/>
+          </a:ln>
+        </p:spPr>
+        <p:style>
+          <a:lnRef idx="1">
+            <a:schemeClr val="accent1"/>
+          </a:lnRef>
+          <a:fillRef idx="0">
+            <a:schemeClr val="accent1"/>
+          </a:fillRef>
+          <a:effectRef idx="0">
+            <a:schemeClr val="accent1"/>
+          </a:effectRef>
+          <a:fontRef idx="minor">
+            <a:schemeClr val="tx1"/>
+          </a:fontRef>
+        </p:style>
+      </p:cxnSp>
+      <p:cxnSp>
+        <p:nvCxnSpPr>
+          <p:cNvPr id="42" name="Connecteur droit avec flèche 41"/>
+          <p:cNvCxnSpPr>
+            <a:stCxn id="6" idx="1"/>
+            <a:endCxn id="13" idx="0"/>
+          </p:cNvCxnSpPr>
+          <p:nvPr/>
+        </p:nvCxnSpPr>
+        <p:spPr>
+          <a:xfrm rot="10800000" flipV="1">
+            <a:off x="1085757" y="950836"/>
+            <a:ext cx="2899594" cy="1337768"/>
+          </a:xfrm>
+          <a:prstGeom prst="curvedConnector2">
+            <a:avLst/>
+          </a:prstGeom>
+          <a:ln w="12700">
+            <a:solidFill>
+              <a:schemeClr val="tx1"/>
+            </a:solidFill>
+            <a:tailEnd type="arrow"/>
+          </a:ln>
+        </p:spPr>
+        <p:style>
+          <a:lnRef idx="1">
+            <a:schemeClr val="accent1"/>
+          </a:lnRef>
+          <a:fillRef idx="0">
+            <a:schemeClr val="accent1"/>
+          </a:fillRef>
+          <a:effectRef idx="0">
+            <a:schemeClr val="accent1"/>
+          </a:effectRef>
+          <a:fontRef idx="minor">
+            <a:schemeClr val="tx1"/>
+          </a:fontRef>
+        </p:style>
+      </p:cxnSp>
+      <p:sp>
+        <p:nvSpPr>
+          <p:cNvPr id="93" name="ZoneTexte 92"/>
+          <p:cNvSpPr txBox="1"/>
+          <p:nvPr/>
+        </p:nvSpPr>
+        <p:spPr>
+          <a:xfrm>
+            <a:off x="7524328" y="159346"/>
+            <a:ext cx="1296144" cy="232219"/>
+          </a:xfrm>
+          <a:prstGeom prst="rect">
+            <a:avLst/>
+          </a:prstGeom>
+          <a:gradFill>
+            <a:gsLst>
+              <a:gs pos="0">
+                <a:schemeClr val="bg2">
+                  <a:lumMod val="75000"/>
+                </a:schemeClr>
+              </a:gs>
+              <a:gs pos="50000">
+                <a:schemeClr val="bg2">
+                  <a:lumMod val="90000"/>
+                </a:schemeClr>
+              </a:gs>
+              <a:gs pos="100000">
+                <a:schemeClr val="bg2">
+                  <a:lumMod val="75000"/>
+                </a:schemeClr>
+              </a:gs>
+            </a:gsLst>
+            <a:lin ang="5400000" scaled="0"/>
+          </a:gradFill>
+          <a:ln>
+            <a:solidFill>
+              <a:schemeClr val="accent1"/>
+            </a:solidFill>
+          </a:ln>
+          <a:effectLst>
+            <a:outerShdw blurRad="50800" dist="38100" dir="2700000" algn="tl" rotWithShape="0">
+              <a:prstClr val="black">
+                <a:alpha val="40000"/>
+              </a:prstClr>
+            </a:outerShdw>
+          </a:effectLst>
+        </p:spPr>
+        <p:txBody>
+          <a:bodyPr wrap="square" rtlCol="0" anchor="ctr" anchorCtr="1">
+            <a:noAutofit/>
+          </a:bodyPr>
+          <a:lstStyle/>
+          <a:p>
+            <a:pPr algn="ctr"/>
+            <a:r>
+              <a:rPr lang="fr-FR" sz="1100" dirty="0" smtClean="0"/>
+              <a:t>APPLICATION</a:t>
+            </a:r>
+            <a:endParaRPr lang="fr-FR" sz="1100" dirty="0"/>
+          </a:p>
+        </p:txBody>
+      </p:sp>
+      <p:sp>
+        <p:nvSpPr>
+          <p:cNvPr id="94" name="ZoneTexte 93"/>
+          <p:cNvSpPr txBox="1"/>
+          <p:nvPr/>
+        </p:nvSpPr>
+        <p:spPr>
+          <a:xfrm>
+            <a:off x="7524328" y="501709"/>
+            <a:ext cx="1296144" cy="218272"/>
           </a:xfrm>
           <a:prstGeom prst="rect">
             <a:avLst/>
@@ -3947,22 +4417,556 @@
           <a:p>
             <a:pPr algn="ctr"/>
             <a:r>
-              <a:rPr lang="fr-FR" dirty="0" smtClean="0"/>
-              <a:t>VIEWER</a:t>
-            </a:r>
-            <a:endParaRPr lang="fr-FR" dirty="0"/>
-          </a:p>
-        </p:txBody>
-      </p:sp>
-      <p:sp>
-        <p:nvSpPr>
-          <p:cNvPr id="13" name="ZoneTexte 12"/>
+              <a:rPr lang="fr-FR" sz="1100" dirty="0" smtClean="0"/>
+              <a:t>COMPOSANT (DLL)</a:t>
+            </a:r>
+            <a:endParaRPr lang="fr-FR" sz="1100" dirty="0"/>
+          </a:p>
+        </p:txBody>
+      </p:sp>
+      <p:sp>
+        <p:nvSpPr>
+          <p:cNvPr id="95" name="ZoneTexte 94"/>
           <p:cNvSpPr txBox="1"/>
           <p:nvPr/>
         </p:nvSpPr>
         <p:spPr>
           <a:xfrm>
-            <a:off x="642376" y="4932517"/>
+            <a:off x="7524328" y="839732"/>
+            <a:ext cx="1296144" cy="213004"/>
+          </a:xfrm>
+          <a:prstGeom prst="rect">
+            <a:avLst/>
+          </a:prstGeom>
+          <a:gradFill>
+            <a:gsLst>
+              <a:gs pos="0">
+                <a:srgbClr val="E1E8F5"/>
+              </a:gs>
+              <a:gs pos="50000">
+                <a:srgbClr val="E8EEF8"/>
+              </a:gs>
+              <a:gs pos="100000">
+                <a:schemeClr val="accent1">
+                  <a:tint val="23500"/>
+                  <a:satMod val="160000"/>
+                </a:schemeClr>
+              </a:gs>
+            </a:gsLst>
+            <a:lin ang="5400000" scaled="0"/>
+          </a:gradFill>
+          <a:ln>
+            <a:solidFill>
+              <a:schemeClr val="accent1"/>
+            </a:solidFill>
+          </a:ln>
+          <a:effectLst>
+            <a:outerShdw blurRad="50800" dist="38100" dir="2700000" algn="tl" rotWithShape="0">
+              <a:prstClr val="black">
+                <a:alpha val="40000"/>
+              </a:prstClr>
+            </a:outerShdw>
+          </a:effectLst>
+        </p:spPr>
+        <p:txBody>
+          <a:bodyPr wrap="square" rtlCol="0" anchor="ctr" anchorCtr="1">
+            <a:noAutofit/>
+          </a:bodyPr>
+          <a:lstStyle/>
+          <a:p>
+            <a:pPr algn="ctr"/>
+            <a:r>
+              <a:rPr lang="fr-FR" sz="1100" dirty="0" smtClean="0"/>
+              <a:t>DLL</a:t>
+            </a:r>
+            <a:endParaRPr lang="fr-FR" sz="1100" dirty="0"/>
+          </a:p>
+        </p:txBody>
+      </p:sp>
+      <p:sp>
+        <p:nvSpPr>
+          <p:cNvPr id="96" name="ZoneTexte 95"/>
+          <p:cNvSpPr txBox="1"/>
+          <p:nvPr/>
+        </p:nvSpPr>
+        <p:spPr>
+          <a:xfrm>
+            <a:off x="8538556" y="1183753"/>
+            <a:ext cx="288032" cy="229023"/>
+          </a:xfrm>
+          <a:prstGeom prst="rect">
+            <a:avLst/>
+          </a:prstGeom>
+          <a:solidFill>
+            <a:schemeClr val="bg1"/>
+          </a:solidFill>
+          <a:ln>
+            <a:solidFill>
+              <a:schemeClr val="accent1"/>
+            </a:solidFill>
+          </a:ln>
+          <a:effectLst>
+            <a:outerShdw blurRad="50800" dist="38100" dir="2700000" algn="tl" rotWithShape="0">
+              <a:prstClr val="black">
+                <a:alpha val="40000"/>
+              </a:prstClr>
+            </a:outerShdw>
+          </a:effectLst>
+        </p:spPr>
+        <p:txBody>
+          <a:bodyPr wrap="square" rtlCol="0" anchor="ctr" anchorCtr="1">
+            <a:noAutofit/>
+          </a:bodyPr>
+          <a:lstStyle/>
+          <a:p>
+            <a:pPr algn="ctr"/>
+            <a:r>
+              <a:rPr lang="fr-FR" sz="1100" dirty="0" smtClean="0"/>
+              <a:t>B</a:t>
+            </a:r>
+            <a:endParaRPr lang="fr-FR" sz="1100" dirty="0"/>
+          </a:p>
+        </p:txBody>
+      </p:sp>
+      <p:sp>
+        <p:nvSpPr>
+          <p:cNvPr id="97" name="ZoneTexte 96"/>
+          <p:cNvSpPr txBox="1"/>
+          <p:nvPr/>
+        </p:nvSpPr>
+        <p:spPr>
+          <a:xfrm>
+            <a:off x="7524328" y="1183752"/>
+            <a:ext cx="288032" cy="229023"/>
+          </a:xfrm>
+          <a:prstGeom prst="rect">
+            <a:avLst/>
+          </a:prstGeom>
+          <a:solidFill>
+            <a:schemeClr val="bg1"/>
+          </a:solidFill>
+          <a:ln>
+            <a:solidFill>
+              <a:schemeClr val="accent1"/>
+            </a:solidFill>
+          </a:ln>
+          <a:effectLst>
+            <a:outerShdw blurRad="50800" dist="38100" dir="2700000" algn="tl" rotWithShape="0">
+              <a:prstClr val="black">
+                <a:alpha val="40000"/>
+              </a:prstClr>
+            </a:outerShdw>
+          </a:effectLst>
+        </p:spPr>
+        <p:txBody>
+          <a:bodyPr wrap="square" rtlCol="0" anchor="ctr" anchorCtr="1">
+            <a:noAutofit/>
+          </a:bodyPr>
+          <a:lstStyle/>
+          <a:p>
+            <a:pPr algn="ctr"/>
+            <a:r>
+              <a:rPr lang="fr-FR" sz="1100" dirty="0" smtClean="0"/>
+              <a:t>A</a:t>
+            </a:r>
+            <a:endParaRPr lang="fr-FR" sz="1100" dirty="0"/>
+          </a:p>
+        </p:txBody>
+      </p:sp>
+      <p:cxnSp>
+        <p:nvCxnSpPr>
+          <p:cNvPr id="98" name="Connecteur droit avec flèche 97"/>
+          <p:cNvCxnSpPr>
+            <a:stCxn id="96" idx="1"/>
+            <a:endCxn id="97" idx="3"/>
+          </p:cNvCxnSpPr>
+          <p:nvPr/>
+        </p:nvCxnSpPr>
+        <p:spPr>
+          <a:xfrm flipH="1" flipV="1">
+            <a:off x="7812360" y="1298264"/>
+            <a:ext cx="726196" cy="1"/>
+          </a:xfrm>
+          <a:prstGeom prst="straightConnector1">
+            <a:avLst/>
+          </a:prstGeom>
+          <a:ln w="12700">
+            <a:solidFill>
+              <a:schemeClr val="tx1"/>
+            </a:solidFill>
+            <a:tailEnd type="arrow"/>
+          </a:ln>
+        </p:spPr>
+        <p:style>
+          <a:lnRef idx="1">
+            <a:schemeClr val="accent1"/>
+          </a:lnRef>
+          <a:fillRef idx="0">
+            <a:schemeClr val="accent1"/>
+          </a:fillRef>
+          <a:effectRef idx="0">
+            <a:schemeClr val="accent1"/>
+          </a:effectRef>
+          <a:fontRef idx="minor">
+            <a:schemeClr val="tx1"/>
+          </a:fontRef>
+        </p:style>
+      </p:cxnSp>
+      <p:sp>
+        <p:nvSpPr>
+          <p:cNvPr id="101" name="ZoneTexte 100"/>
+          <p:cNvSpPr txBox="1"/>
+          <p:nvPr/>
+        </p:nvSpPr>
+        <p:spPr>
+          <a:xfrm>
+            <a:off x="7715907" y="1268760"/>
+            <a:ext cx="942364" cy="261610"/>
+          </a:xfrm>
+          <a:prstGeom prst="rect">
+            <a:avLst/>
+          </a:prstGeom>
+          <a:noFill/>
+        </p:spPr>
+        <p:txBody>
+          <a:bodyPr wrap="square" rtlCol="0">
+            <a:spAutoFit/>
+          </a:bodyPr>
+          <a:lstStyle/>
+          <a:p>
+            <a:pPr algn="ctr"/>
+            <a:r>
+              <a:rPr lang="fr-FR" sz="1100" dirty="0" smtClean="0"/>
+              <a:t>A utilise B</a:t>
+            </a:r>
+            <a:endParaRPr lang="fr-FR" sz="1100" dirty="0"/>
+          </a:p>
+        </p:txBody>
+      </p:sp>
+      <p:sp>
+        <p:nvSpPr>
+          <p:cNvPr id="31" name="ZoneTexte 30"/>
+          <p:cNvSpPr txBox="1"/>
+          <p:nvPr/>
+        </p:nvSpPr>
+        <p:spPr>
+          <a:xfrm>
+            <a:off x="2154677" y="4187860"/>
+            <a:ext cx="1440160" cy="648072"/>
+          </a:xfrm>
+          <a:prstGeom prst="rect">
+            <a:avLst/>
+          </a:prstGeom>
+          <a:gradFill>
+            <a:gsLst>
+              <a:gs pos="0">
+                <a:srgbClr val="E1E8F5"/>
+              </a:gs>
+              <a:gs pos="50000">
+                <a:srgbClr val="E8EEF8"/>
+              </a:gs>
+              <a:gs pos="100000">
+                <a:schemeClr val="accent1">
+                  <a:tint val="23500"/>
+                  <a:satMod val="160000"/>
+                </a:schemeClr>
+              </a:gs>
+            </a:gsLst>
+            <a:lin ang="5400000" scaled="0"/>
+          </a:gradFill>
+          <a:ln>
+            <a:solidFill>
+              <a:schemeClr val="accent1"/>
+            </a:solidFill>
+          </a:ln>
+          <a:effectLst>
+            <a:outerShdw blurRad="50800" dist="38100" dir="2700000" algn="tl" rotWithShape="0">
+              <a:prstClr val="black">
+                <a:alpha val="40000"/>
+              </a:prstClr>
+            </a:outerShdw>
+          </a:effectLst>
+        </p:spPr>
+        <p:txBody>
+          <a:bodyPr wrap="square" rtlCol="0" anchor="ctr" anchorCtr="1">
+            <a:noAutofit/>
+          </a:bodyPr>
+          <a:lstStyle/>
+          <a:p>
+            <a:pPr algn="ctr"/>
+            <a:r>
+              <a:rPr lang="fr-FR" dirty="0" smtClean="0"/>
+              <a:t>EXPORT</a:t>
+            </a:r>
+            <a:endParaRPr lang="fr-FR" dirty="0"/>
+          </a:p>
+        </p:txBody>
+      </p:sp>
+      <p:cxnSp>
+        <p:nvCxnSpPr>
+          <p:cNvPr id="41" name="Connecteur droit avec flèche 40"/>
+          <p:cNvCxnSpPr>
+            <a:stCxn id="6" idx="1"/>
+            <a:endCxn id="31" idx="0"/>
+          </p:cNvCxnSpPr>
+          <p:nvPr/>
+        </p:nvCxnSpPr>
+        <p:spPr>
+          <a:xfrm rot="10800000" flipV="1">
+            <a:off x="2874757" y="950836"/>
+            <a:ext cx="1110594" cy="3237024"/>
+          </a:xfrm>
+          <a:prstGeom prst="curvedConnector2">
+            <a:avLst/>
+          </a:prstGeom>
+          <a:ln w="12700">
+            <a:solidFill>
+              <a:schemeClr val="tx1"/>
+            </a:solidFill>
+            <a:tailEnd type="arrow"/>
+          </a:ln>
+        </p:spPr>
+        <p:style>
+          <a:lnRef idx="1">
+            <a:schemeClr val="accent1"/>
+          </a:lnRef>
+          <a:fillRef idx="0">
+            <a:schemeClr val="accent1"/>
+          </a:fillRef>
+          <a:effectRef idx="0">
+            <a:schemeClr val="accent1"/>
+          </a:effectRef>
+          <a:fontRef idx="minor">
+            <a:schemeClr val="tx1"/>
+          </a:fontRef>
+        </p:style>
+      </p:cxnSp>
+      <p:cxnSp>
+        <p:nvCxnSpPr>
+          <p:cNvPr id="49" name="Connecteur droit avec flèche 48"/>
+          <p:cNvCxnSpPr>
+            <a:stCxn id="31" idx="3"/>
+            <a:endCxn id="14" idx="0"/>
+          </p:cNvCxnSpPr>
+          <p:nvPr/>
+        </p:nvCxnSpPr>
+        <p:spPr>
+          <a:xfrm>
+            <a:off x="3594837" y="4511896"/>
+            <a:ext cx="2993387" cy="426009"/>
+          </a:xfrm>
+          <a:prstGeom prst="curvedConnector2">
+            <a:avLst/>
+          </a:prstGeom>
+          <a:ln w="12700">
+            <a:solidFill>
+              <a:schemeClr val="tx1"/>
+            </a:solidFill>
+            <a:tailEnd type="arrow"/>
+          </a:ln>
+        </p:spPr>
+        <p:style>
+          <a:lnRef idx="1">
+            <a:schemeClr val="accent1"/>
+          </a:lnRef>
+          <a:fillRef idx="0">
+            <a:schemeClr val="accent1"/>
+          </a:fillRef>
+          <a:effectRef idx="0">
+            <a:schemeClr val="accent1"/>
+          </a:effectRef>
+          <a:fontRef idx="minor">
+            <a:schemeClr val="tx1"/>
+          </a:fontRef>
+        </p:style>
+      </p:cxnSp>
+      <p:sp>
+        <p:nvSpPr>
+          <p:cNvPr id="107" name="ZoneTexte 106"/>
+          <p:cNvSpPr txBox="1"/>
+          <p:nvPr/>
+        </p:nvSpPr>
+        <p:spPr>
+          <a:xfrm>
+            <a:off x="5068335" y="6021288"/>
+            <a:ext cx="1440160" cy="648072"/>
+          </a:xfrm>
+          <a:prstGeom prst="rect">
+            <a:avLst/>
+          </a:prstGeom>
+          <a:gradFill>
+            <a:gsLst>
+              <a:gs pos="0">
+                <a:srgbClr val="E1E8F5"/>
+              </a:gs>
+              <a:gs pos="50000">
+                <a:srgbClr val="E8EEF8"/>
+              </a:gs>
+              <a:gs pos="100000">
+                <a:schemeClr val="accent1">
+                  <a:tint val="23500"/>
+                  <a:satMod val="160000"/>
+                </a:schemeClr>
+              </a:gs>
+            </a:gsLst>
+            <a:lin ang="5400000" scaled="0"/>
+          </a:gradFill>
+          <a:ln>
+            <a:solidFill>
+              <a:schemeClr val="accent1"/>
+            </a:solidFill>
+          </a:ln>
+          <a:effectLst>
+            <a:outerShdw blurRad="50800" dist="38100" dir="2700000" algn="tl" rotWithShape="0">
+              <a:prstClr val="black">
+                <a:alpha val="40000"/>
+              </a:prstClr>
+            </a:outerShdw>
+          </a:effectLst>
+        </p:spPr>
+        <p:txBody>
+          <a:bodyPr wrap="square" rtlCol="0" anchor="ctr" anchorCtr="1">
+            <a:noAutofit/>
+          </a:bodyPr>
+          <a:lstStyle/>
+          <a:p>
+            <a:pPr algn="ctr"/>
+            <a:r>
+              <a:rPr lang="fr-FR" dirty="0" smtClean="0"/>
+              <a:t>COMMON</a:t>
+            </a:r>
+            <a:endParaRPr lang="fr-FR" dirty="0"/>
+          </a:p>
+        </p:txBody>
+      </p:sp>
+      <p:cxnSp>
+        <p:nvCxnSpPr>
+          <p:cNvPr id="108" name="Connecteur droit avec flèche 107"/>
+          <p:cNvCxnSpPr>
+            <a:stCxn id="107" idx="3"/>
+            <a:endCxn id="5" idx="2"/>
+          </p:cNvCxnSpPr>
+          <p:nvPr/>
+        </p:nvCxnSpPr>
+        <p:spPr>
+          <a:xfrm flipV="1">
+            <a:off x="6508495" y="3195044"/>
+            <a:ext cx="1711634" cy="3150280"/>
+          </a:xfrm>
+          <a:prstGeom prst="curvedConnector2">
+            <a:avLst/>
+          </a:prstGeom>
+          <a:ln w="12700">
+            <a:solidFill>
+              <a:schemeClr val="tx1"/>
+            </a:solidFill>
+            <a:tailEnd type="arrow"/>
+          </a:ln>
+        </p:spPr>
+        <p:style>
+          <a:lnRef idx="1">
+            <a:schemeClr val="accent1"/>
+          </a:lnRef>
+          <a:fillRef idx="0">
+            <a:schemeClr val="accent1"/>
+          </a:fillRef>
+          <a:effectRef idx="0">
+            <a:schemeClr val="accent1"/>
+          </a:effectRef>
+          <a:fontRef idx="minor">
+            <a:schemeClr val="tx1"/>
+          </a:fontRef>
+        </p:style>
+      </p:cxnSp>
+      <p:cxnSp>
+        <p:nvCxnSpPr>
+          <p:cNvPr id="111" name="Connecteur droit avec flèche 110"/>
+          <p:cNvCxnSpPr>
+            <a:stCxn id="107" idx="1"/>
+            <a:endCxn id="31" idx="2"/>
+          </p:cNvCxnSpPr>
+          <p:nvPr/>
+        </p:nvCxnSpPr>
+        <p:spPr>
+          <a:xfrm rot="10800000">
+            <a:off x="2874757" y="4835932"/>
+            <a:ext cx="2193578" cy="1509392"/>
+          </a:xfrm>
+          <a:prstGeom prst="curvedConnector2">
+            <a:avLst/>
+          </a:prstGeom>
+          <a:ln w="12700">
+            <a:solidFill>
+              <a:schemeClr val="tx1"/>
+            </a:solidFill>
+            <a:tailEnd type="arrow"/>
+          </a:ln>
+        </p:spPr>
+        <p:style>
+          <a:lnRef idx="1">
+            <a:schemeClr val="accent1"/>
+          </a:lnRef>
+          <a:fillRef idx="0">
+            <a:schemeClr val="accent1"/>
+          </a:fillRef>
+          <a:effectRef idx="0">
+            <a:schemeClr val="accent1"/>
+          </a:effectRef>
+          <a:fontRef idx="minor">
+            <a:schemeClr val="tx1"/>
+          </a:fontRef>
+        </p:style>
+      </p:cxnSp>
+      <p:cxnSp>
+        <p:nvCxnSpPr>
+          <p:cNvPr id="114" name="Connecteur droit avec flèche 113"/>
+          <p:cNvCxnSpPr>
+            <a:stCxn id="107" idx="0"/>
+            <a:endCxn id="14" idx="2"/>
+          </p:cNvCxnSpPr>
+          <p:nvPr/>
+        </p:nvCxnSpPr>
+        <p:spPr>
+          <a:xfrm rot="5400000" flipH="1" flipV="1">
+            <a:off x="5970663" y="5403728"/>
+            <a:ext cx="435312" cy="799809"/>
+          </a:xfrm>
+          <a:prstGeom prst="curvedConnector3">
+            <a:avLst>
+              <a:gd name="adj1" fmla="val 50000"/>
+            </a:avLst>
+          </a:prstGeom>
+          <a:ln w="12700">
+            <a:solidFill>
+              <a:schemeClr val="tx1"/>
+            </a:solidFill>
+            <a:tailEnd type="arrow"/>
+          </a:ln>
+        </p:spPr>
+        <p:style>
+          <a:lnRef idx="1">
+            <a:schemeClr val="accent1"/>
+          </a:lnRef>
+          <a:fillRef idx="0">
+            <a:schemeClr val="accent1"/>
+          </a:fillRef>
+          <a:effectRef idx="0">
+            <a:schemeClr val="accent1"/>
+          </a:effectRef>
+          <a:fontRef idx="minor">
+            <a:schemeClr val="tx1"/>
+          </a:fontRef>
+        </p:style>
+      </p:cxnSp>
+      <p:sp>
+        <p:nvSpPr>
+          <p:cNvPr id="123" name="ZoneTexte 122"/>
+          <p:cNvSpPr txBox="1"/>
+          <p:nvPr/>
+        </p:nvSpPr>
+        <p:spPr>
+          <a:xfrm>
+            <a:off x="467544" y="5651255"/>
             <a:ext cx="1440160" cy="648071"/>
           </a:xfrm>
           <a:prstGeom prst="rect">
@@ -4010,69 +5014,7 @@
             <a:pPr algn="ctr"/>
             <a:r>
               <a:rPr lang="fr-FR" dirty="0" smtClean="0"/>
-              <a:t>STAT</a:t>
-            </a:r>
-            <a:endParaRPr lang="fr-FR" dirty="0"/>
-          </a:p>
-        </p:txBody>
-      </p:sp>
-      <p:sp>
-        <p:nvSpPr>
-          <p:cNvPr id="14" name="ZoneTexte 13"/>
-          <p:cNvSpPr txBox="1"/>
-          <p:nvPr/>
-        </p:nvSpPr>
-        <p:spPr>
-          <a:xfrm>
-            <a:off x="642376" y="3609518"/>
-            <a:ext cx="1440160" cy="648071"/>
-          </a:xfrm>
-          <a:prstGeom prst="rect">
-            <a:avLst/>
-          </a:prstGeom>
-          <a:gradFill>
-            <a:gsLst>
-              <a:gs pos="0">
-                <a:schemeClr val="bg2">
-                  <a:lumMod val="75000"/>
-                </a:schemeClr>
-              </a:gs>
-              <a:gs pos="50000">
-                <a:schemeClr val="bg2">
-                  <a:lumMod val="90000"/>
-                </a:schemeClr>
-              </a:gs>
-              <a:gs pos="100000">
-                <a:schemeClr val="bg2">
-                  <a:lumMod val="75000"/>
-                </a:schemeClr>
-              </a:gs>
-            </a:gsLst>
-            <a:lin ang="5400000" scaled="0"/>
-          </a:gradFill>
-          <a:ln>
-            <a:solidFill>
-              <a:schemeClr val="accent1"/>
-            </a:solidFill>
-          </a:ln>
-          <a:effectLst>
-            <a:outerShdw blurRad="50800" dist="38100" dir="2700000" algn="tl" rotWithShape="0">
-              <a:prstClr val="black">
-                <a:alpha val="40000"/>
-              </a:prstClr>
-            </a:outerShdw>
-          </a:effectLst>
-        </p:spPr>
-        <p:txBody>
-          <a:bodyPr wrap="square" rtlCol="0" anchor="ctr" anchorCtr="1">
-            <a:noAutofit/>
-          </a:bodyPr>
-          <a:lstStyle/>
-          <a:p>
-            <a:pPr algn="ctr"/>
-            <a:r>
-              <a:rPr lang="fr-FR" dirty="0" smtClean="0"/>
-              <a:t>MANAGER</a:t>
+              <a:t>EXPORT CMD</a:t>
             </a:r>
             <a:endParaRPr lang="fr-FR" dirty="0"/>
           </a:p>
@@ -4080,19 +5022,19 @@
       </p:sp>
       <p:cxnSp>
         <p:nvCxnSpPr>
-          <p:cNvPr id="16" name="Connecteur droit avec flèche 15"/>
+          <p:cNvPr id="124" name="Connecteur droit avec flèche 123"/>
           <p:cNvCxnSpPr>
-            <a:stCxn id="14" idx="3"/>
-            <a:endCxn id="6" idx="1"/>
+            <a:stCxn id="31" idx="1"/>
+            <a:endCxn id="123" idx="0"/>
           </p:cNvCxnSpPr>
           <p:nvPr/>
         </p:nvCxnSpPr>
         <p:spPr>
-          <a:xfrm>
-            <a:off x="2082536" y="3933554"/>
-            <a:ext cx="3468276" cy="1405706"/>
-          </a:xfrm>
-          <a:prstGeom prst="straightConnector1">
+          <a:xfrm rot="10800000" flipV="1">
+            <a:off x="1187625" y="4511895"/>
+            <a:ext cx="967053" cy="1139359"/>
+          </a:xfrm>
+          <a:prstGeom prst="curvedConnector2">
             <a:avLst/>
           </a:prstGeom>
           <a:ln w="12700">
@@ -4119,19 +5061,19 @@
       </p:cxnSp>
       <p:cxnSp>
         <p:nvCxnSpPr>
-          <p:cNvPr id="17" name="Connecteur droit avec flèche 16"/>
+          <p:cNvPr id="162" name="Connecteur droit avec flèche 161"/>
           <p:cNvCxnSpPr>
-            <a:stCxn id="14" idx="3"/>
-            <a:endCxn id="11" idx="1"/>
+            <a:stCxn id="6" idx="3"/>
+            <a:endCxn id="5" idx="0"/>
           </p:cNvCxnSpPr>
           <p:nvPr/>
         </p:nvCxnSpPr>
         <p:spPr>
-          <a:xfrm flipV="1">
-            <a:off x="2082536" y="3384345"/>
-            <a:ext cx="1018622" cy="549209"/>
-          </a:xfrm>
-          <a:prstGeom prst="straightConnector1">
+          <a:xfrm>
+            <a:off x="5425511" y="950836"/>
+            <a:ext cx="2794618" cy="1596136"/>
+          </a:xfrm>
+          <a:prstGeom prst="curvedConnector2">
             <a:avLst/>
           </a:prstGeom>
           <a:ln w="12700">
@@ -4158,20 +5100,23 @@
       </p:cxnSp>
       <p:cxnSp>
         <p:nvCxnSpPr>
-          <p:cNvPr id="22" name="Connecteur droit avec flèche 21"/>
+          <p:cNvPr id="323" name="Connecteur droit avec flèche 21"/>
           <p:cNvCxnSpPr>
-            <a:stCxn id="7" idx="3"/>
-            <a:endCxn id="11" idx="1"/>
+            <a:stCxn id="6" idx="1"/>
+            <a:endCxn id="7" idx="0"/>
           </p:cNvCxnSpPr>
           <p:nvPr/>
         </p:nvCxnSpPr>
         <p:spPr>
-          <a:xfrm>
-            <a:off x="2082536" y="2610554"/>
-            <a:ext cx="1018622" cy="773791"/>
-          </a:xfrm>
-          <a:prstGeom prst="straightConnector1">
-            <a:avLst/>
+          <a:xfrm rot="10800000" flipH="1" flipV="1">
+            <a:off x="3985351" y="950836"/>
+            <a:ext cx="297908" cy="886130"/>
+          </a:xfrm>
+          <a:prstGeom prst="curvedConnector4">
+            <a:avLst>
+              <a:gd name="adj1" fmla="val -76735"/>
+              <a:gd name="adj2" fmla="val 68284"/>
+            </a:avLst>
           </a:prstGeom>
           <a:ln w="12700">
             <a:solidFill>
@@ -4197,657 +5142,19 @@
       </p:cxnSp>
       <p:cxnSp>
         <p:nvCxnSpPr>
-          <p:cNvPr id="30" name="Connecteur droit avec flèche 29"/>
+          <p:cNvPr id="328" name="Connecteur droit avec flèche 21"/>
           <p:cNvCxnSpPr>
-            <a:stCxn id="9" idx="0"/>
-            <a:endCxn id="5" idx="2"/>
+            <a:stCxn id="5" idx="1"/>
+            <a:endCxn id="7" idx="2"/>
           </p:cNvCxnSpPr>
           <p:nvPr/>
         </p:nvCxnSpPr>
         <p:spPr>
-          <a:xfrm flipV="1">
-            <a:off x="6270892" y="2286518"/>
-            <a:ext cx="0" cy="599757"/>
-          </a:xfrm>
-          <a:prstGeom prst="straightConnector1">
-            <a:avLst/>
-          </a:prstGeom>
-          <a:ln w="12700">
-            <a:solidFill>
-              <a:schemeClr val="tx1"/>
-            </a:solidFill>
-            <a:tailEnd type="arrow"/>
-          </a:ln>
-        </p:spPr>
-        <p:style>
-          <a:lnRef idx="1">
-            <a:schemeClr val="accent1"/>
-          </a:lnRef>
-          <a:fillRef idx="0">
-            <a:schemeClr val="accent1"/>
-          </a:fillRef>
-          <a:effectRef idx="0">
-            <a:schemeClr val="accent1"/>
-          </a:effectRef>
-          <a:fontRef idx="minor">
-            <a:schemeClr val="tx1"/>
-          </a:fontRef>
-        </p:style>
-      </p:cxnSp>
-      <p:cxnSp>
-        <p:nvCxnSpPr>
-          <p:cNvPr id="33" name="Connecteur droit avec flèche 32"/>
-          <p:cNvCxnSpPr>
-            <a:stCxn id="9" idx="2"/>
-            <a:endCxn id="6" idx="0"/>
-          </p:cNvCxnSpPr>
-          <p:nvPr/>
-        </p:nvCxnSpPr>
-        <p:spPr>
-          <a:xfrm>
-            <a:off x="6270892" y="3534347"/>
-            <a:ext cx="0" cy="1480877"/>
-          </a:xfrm>
-          <a:prstGeom prst="straightConnector1">
-            <a:avLst/>
-          </a:prstGeom>
-          <a:ln w="12700">
-            <a:solidFill>
-              <a:schemeClr val="tx1"/>
-            </a:solidFill>
-            <a:tailEnd type="arrow"/>
-          </a:ln>
-        </p:spPr>
-        <p:style>
-          <a:lnRef idx="1">
-            <a:schemeClr val="accent1"/>
-          </a:lnRef>
-          <a:fillRef idx="0">
-            <a:schemeClr val="accent1"/>
-          </a:fillRef>
-          <a:effectRef idx="0">
-            <a:schemeClr val="accent1"/>
-          </a:effectRef>
-          <a:fontRef idx="minor">
-            <a:schemeClr val="tx1"/>
-          </a:fontRef>
-        </p:style>
-      </p:cxnSp>
-      <p:cxnSp>
-        <p:nvCxnSpPr>
-          <p:cNvPr id="36" name="Connecteur droit avec flèche 35"/>
-          <p:cNvCxnSpPr>
-            <a:stCxn id="31" idx="0"/>
-            <a:endCxn id="9" idx="3"/>
-          </p:cNvCxnSpPr>
-          <p:nvPr/>
-        </p:nvCxnSpPr>
-        <p:spPr>
-          <a:xfrm flipH="1" flipV="1">
-            <a:off x="6990972" y="3210311"/>
-            <a:ext cx="724934" cy="798044"/>
-          </a:xfrm>
-          <a:prstGeom prst="straightConnector1">
-            <a:avLst/>
-          </a:prstGeom>
-          <a:ln w="12700">
-            <a:solidFill>
-              <a:schemeClr val="tx1"/>
-            </a:solidFill>
-            <a:tailEnd type="arrow"/>
-          </a:ln>
-        </p:spPr>
-        <p:style>
-          <a:lnRef idx="1">
-            <a:schemeClr val="accent1"/>
-          </a:lnRef>
-          <a:fillRef idx="0">
-            <a:schemeClr val="accent1"/>
-          </a:fillRef>
-          <a:effectRef idx="0">
-            <a:schemeClr val="accent1"/>
-          </a:effectRef>
-          <a:fontRef idx="minor">
-            <a:schemeClr val="tx1"/>
-          </a:fontRef>
-        </p:style>
-      </p:cxnSp>
-      <p:cxnSp>
-        <p:nvCxnSpPr>
-          <p:cNvPr id="39" name="Connecteur droit avec flèche 38"/>
-          <p:cNvCxnSpPr>
-            <a:stCxn id="11" idx="3"/>
-            <a:endCxn id="9" idx="1"/>
-          </p:cNvCxnSpPr>
-          <p:nvPr/>
-        </p:nvCxnSpPr>
-        <p:spPr>
-          <a:xfrm flipV="1">
-            <a:off x="4541318" y="3210311"/>
-            <a:ext cx="1009494" cy="174034"/>
-          </a:xfrm>
-          <a:prstGeom prst="straightConnector1">
-            <a:avLst/>
-          </a:prstGeom>
-          <a:ln w="12700">
-            <a:solidFill>
-              <a:schemeClr val="tx1"/>
-            </a:solidFill>
-            <a:tailEnd type="arrow"/>
-          </a:ln>
-        </p:spPr>
-        <p:style>
-          <a:lnRef idx="1">
-            <a:schemeClr val="accent1"/>
-          </a:lnRef>
-          <a:fillRef idx="0">
-            <a:schemeClr val="accent1"/>
-          </a:fillRef>
-          <a:effectRef idx="0">
-            <a:schemeClr val="accent1"/>
-          </a:effectRef>
-          <a:fontRef idx="minor">
-            <a:schemeClr val="tx1"/>
-          </a:fontRef>
-        </p:style>
-      </p:cxnSp>
-      <p:cxnSp>
-        <p:nvCxnSpPr>
-          <p:cNvPr id="42" name="Connecteur droit avec flèche 41"/>
-          <p:cNvCxnSpPr>
-            <a:stCxn id="13" idx="3"/>
-            <a:endCxn id="6" idx="1"/>
-          </p:cNvCxnSpPr>
-          <p:nvPr/>
-        </p:nvCxnSpPr>
-        <p:spPr>
-          <a:xfrm>
-            <a:off x="2082536" y="5256553"/>
-            <a:ext cx="3468276" cy="82707"/>
-          </a:xfrm>
-          <a:prstGeom prst="straightConnector1">
-            <a:avLst/>
-          </a:prstGeom>
-          <a:ln w="12700">
-            <a:solidFill>
-              <a:schemeClr val="tx1"/>
-            </a:solidFill>
-            <a:tailEnd type="arrow"/>
-          </a:ln>
-        </p:spPr>
-        <p:style>
-          <a:lnRef idx="1">
-            <a:schemeClr val="accent1"/>
-          </a:lnRef>
-          <a:fillRef idx="0">
-            <a:schemeClr val="accent1"/>
-          </a:fillRef>
-          <a:effectRef idx="0">
-            <a:schemeClr val="accent1"/>
-          </a:effectRef>
-          <a:fontRef idx="minor">
-            <a:schemeClr val="tx1"/>
-          </a:fontRef>
-        </p:style>
-      </p:cxnSp>
-      <p:sp>
-        <p:nvSpPr>
-          <p:cNvPr id="93" name="ZoneTexte 92"/>
-          <p:cNvSpPr txBox="1"/>
-          <p:nvPr/>
-        </p:nvSpPr>
-        <p:spPr>
-          <a:xfrm>
-            <a:off x="7524328" y="159346"/>
-            <a:ext cx="1296144" cy="232219"/>
-          </a:xfrm>
-          <a:prstGeom prst="rect">
-            <a:avLst/>
-          </a:prstGeom>
-          <a:gradFill>
-            <a:gsLst>
-              <a:gs pos="0">
-                <a:schemeClr val="bg2">
-                  <a:lumMod val="75000"/>
-                </a:schemeClr>
-              </a:gs>
-              <a:gs pos="50000">
-                <a:schemeClr val="bg2">
-                  <a:lumMod val="90000"/>
-                </a:schemeClr>
-              </a:gs>
-              <a:gs pos="100000">
-                <a:schemeClr val="bg2">
-                  <a:lumMod val="75000"/>
-                </a:schemeClr>
-              </a:gs>
-            </a:gsLst>
-            <a:lin ang="5400000" scaled="0"/>
-          </a:gradFill>
-          <a:ln>
-            <a:solidFill>
-              <a:schemeClr val="accent1"/>
-            </a:solidFill>
-          </a:ln>
-          <a:effectLst>
-            <a:outerShdw blurRad="50800" dist="38100" dir="2700000" algn="tl" rotWithShape="0">
-              <a:prstClr val="black">
-                <a:alpha val="40000"/>
-              </a:prstClr>
-            </a:outerShdw>
-          </a:effectLst>
-        </p:spPr>
-        <p:txBody>
-          <a:bodyPr wrap="square" rtlCol="0" anchor="ctr" anchorCtr="1">
-            <a:noAutofit/>
-          </a:bodyPr>
-          <a:lstStyle/>
-          <a:p>
-            <a:pPr algn="ctr"/>
-            <a:r>
-              <a:rPr lang="fr-FR" sz="1100" dirty="0" smtClean="0"/>
-              <a:t>APPLICATION</a:t>
-            </a:r>
-            <a:endParaRPr lang="fr-FR" sz="1100" dirty="0"/>
-          </a:p>
-        </p:txBody>
-      </p:sp>
-      <p:sp>
-        <p:nvSpPr>
-          <p:cNvPr id="94" name="ZoneTexte 93"/>
-          <p:cNvSpPr txBox="1"/>
-          <p:nvPr/>
-        </p:nvSpPr>
-        <p:spPr>
-          <a:xfrm>
-            <a:off x="7524328" y="501709"/>
-            <a:ext cx="1296144" cy="218272"/>
-          </a:xfrm>
-          <a:prstGeom prst="rect">
-            <a:avLst/>
-          </a:prstGeom>
-          <a:gradFill>
-            <a:gsLst>
-              <a:gs pos="0">
-                <a:schemeClr val="accent6">
-                  <a:lumMod val="60000"/>
-                  <a:lumOff val="40000"/>
-                </a:schemeClr>
-              </a:gs>
-              <a:gs pos="50000">
-                <a:schemeClr val="accent6">
-                  <a:lumMod val="20000"/>
-                  <a:lumOff val="80000"/>
-                </a:schemeClr>
-              </a:gs>
-              <a:gs pos="100000">
-                <a:schemeClr val="accent6">
-                  <a:lumMod val="60000"/>
-                  <a:lumOff val="40000"/>
-                </a:schemeClr>
-              </a:gs>
-            </a:gsLst>
-            <a:lin ang="5400000" scaled="0"/>
-          </a:gradFill>
-          <a:ln>
-            <a:solidFill>
-              <a:schemeClr val="accent1"/>
-            </a:solidFill>
-          </a:ln>
-          <a:effectLst>
-            <a:outerShdw blurRad="50800" dist="38100" dir="2700000" algn="tl" rotWithShape="0">
-              <a:prstClr val="black">
-                <a:alpha val="40000"/>
-              </a:prstClr>
-            </a:outerShdw>
-          </a:effectLst>
-        </p:spPr>
-        <p:txBody>
-          <a:bodyPr wrap="square" rtlCol="0" anchor="ctr" anchorCtr="1">
-            <a:noAutofit/>
-          </a:bodyPr>
-          <a:lstStyle/>
-          <a:p>
-            <a:pPr algn="ctr"/>
-            <a:r>
-              <a:rPr lang="fr-FR" sz="1100" dirty="0" smtClean="0"/>
-              <a:t>COMPOSANT (DLL)</a:t>
-            </a:r>
-            <a:endParaRPr lang="fr-FR" sz="1100" dirty="0"/>
-          </a:p>
-        </p:txBody>
-      </p:sp>
-      <p:sp>
-        <p:nvSpPr>
-          <p:cNvPr id="95" name="ZoneTexte 94"/>
-          <p:cNvSpPr txBox="1"/>
-          <p:nvPr/>
-        </p:nvSpPr>
-        <p:spPr>
-          <a:xfrm>
-            <a:off x="7524328" y="839732"/>
-            <a:ext cx="1296144" cy="213004"/>
-          </a:xfrm>
-          <a:prstGeom prst="rect">
-            <a:avLst/>
-          </a:prstGeom>
-          <a:gradFill>
-            <a:gsLst>
-              <a:gs pos="0">
-                <a:srgbClr val="E1E8F5"/>
-              </a:gs>
-              <a:gs pos="50000">
-                <a:srgbClr val="E8EEF8"/>
-              </a:gs>
-              <a:gs pos="100000">
-                <a:schemeClr val="accent1">
-                  <a:tint val="23500"/>
-                  <a:satMod val="160000"/>
-                </a:schemeClr>
-              </a:gs>
-            </a:gsLst>
-            <a:lin ang="5400000" scaled="0"/>
-          </a:gradFill>
-          <a:ln>
-            <a:solidFill>
-              <a:schemeClr val="accent1"/>
-            </a:solidFill>
-          </a:ln>
-          <a:effectLst>
-            <a:outerShdw blurRad="50800" dist="38100" dir="2700000" algn="tl" rotWithShape="0">
-              <a:prstClr val="black">
-                <a:alpha val="40000"/>
-              </a:prstClr>
-            </a:outerShdw>
-          </a:effectLst>
-        </p:spPr>
-        <p:txBody>
-          <a:bodyPr wrap="square" rtlCol="0" anchor="ctr" anchorCtr="1">
-            <a:noAutofit/>
-          </a:bodyPr>
-          <a:lstStyle/>
-          <a:p>
-            <a:pPr algn="ctr"/>
-            <a:r>
-              <a:rPr lang="fr-FR" sz="1100" dirty="0" smtClean="0"/>
-              <a:t>DLL</a:t>
-            </a:r>
-            <a:endParaRPr lang="fr-FR" sz="1100" dirty="0"/>
-          </a:p>
-        </p:txBody>
-      </p:sp>
-      <p:sp>
-        <p:nvSpPr>
-          <p:cNvPr id="96" name="ZoneTexte 95"/>
-          <p:cNvSpPr txBox="1"/>
-          <p:nvPr/>
-        </p:nvSpPr>
-        <p:spPr>
-          <a:xfrm>
-            <a:off x="8538556" y="1183753"/>
-            <a:ext cx="288032" cy="229023"/>
-          </a:xfrm>
-          <a:prstGeom prst="rect">
-            <a:avLst/>
-          </a:prstGeom>
-          <a:solidFill>
-            <a:schemeClr val="bg1"/>
-          </a:solidFill>
-          <a:ln>
-            <a:solidFill>
-              <a:schemeClr val="accent1"/>
-            </a:solidFill>
-          </a:ln>
-          <a:effectLst>
-            <a:outerShdw blurRad="50800" dist="38100" dir="2700000" algn="tl" rotWithShape="0">
-              <a:prstClr val="black">
-                <a:alpha val="40000"/>
-              </a:prstClr>
-            </a:outerShdw>
-          </a:effectLst>
-        </p:spPr>
-        <p:txBody>
-          <a:bodyPr wrap="square" rtlCol="0" anchor="ctr" anchorCtr="1">
-            <a:noAutofit/>
-          </a:bodyPr>
-          <a:lstStyle/>
-          <a:p>
-            <a:pPr algn="ctr"/>
-            <a:r>
-              <a:rPr lang="fr-FR" sz="1100" dirty="0" smtClean="0"/>
-              <a:t>B</a:t>
-            </a:r>
-            <a:endParaRPr lang="fr-FR" sz="1100" dirty="0"/>
-          </a:p>
-        </p:txBody>
-      </p:sp>
-      <p:sp>
-        <p:nvSpPr>
-          <p:cNvPr id="97" name="ZoneTexte 96"/>
-          <p:cNvSpPr txBox="1"/>
-          <p:nvPr/>
-        </p:nvSpPr>
-        <p:spPr>
-          <a:xfrm>
-            <a:off x="7524328" y="1183752"/>
-            <a:ext cx="288032" cy="229023"/>
-          </a:xfrm>
-          <a:prstGeom prst="rect">
-            <a:avLst/>
-          </a:prstGeom>
-          <a:solidFill>
-            <a:schemeClr val="bg1"/>
-          </a:solidFill>
-          <a:ln>
-            <a:solidFill>
-              <a:schemeClr val="accent1"/>
-            </a:solidFill>
-          </a:ln>
-          <a:effectLst>
-            <a:outerShdw blurRad="50800" dist="38100" dir="2700000" algn="tl" rotWithShape="0">
-              <a:prstClr val="black">
-                <a:alpha val="40000"/>
-              </a:prstClr>
-            </a:outerShdw>
-          </a:effectLst>
-        </p:spPr>
-        <p:txBody>
-          <a:bodyPr wrap="square" rtlCol="0" anchor="ctr" anchorCtr="1">
-            <a:noAutofit/>
-          </a:bodyPr>
-          <a:lstStyle/>
-          <a:p>
-            <a:pPr algn="ctr"/>
-            <a:r>
-              <a:rPr lang="fr-FR" sz="1100" dirty="0" smtClean="0"/>
-              <a:t>A</a:t>
-            </a:r>
-            <a:endParaRPr lang="fr-FR" sz="1100" dirty="0"/>
-          </a:p>
-        </p:txBody>
-      </p:sp>
-      <p:cxnSp>
-        <p:nvCxnSpPr>
-          <p:cNvPr id="98" name="Connecteur droit avec flèche 97"/>
-          <p:cNvCxnSpPr>
-            <a:stCxn id="97" idx="3"/>
-            <a:endCxn id="96" idx="1"/>
-          </p:cNvCxnSpPr>
-          <p:nvPr/>
-        </p:nvCxnSpPr>
-        <p:spPr>
-          <a:xfrm>
-            <a:off x="7812360" y="1298264"/>
-            <a:ext cx="726196" cy="1"/>
-          </a:xfrm>
-          <a:prstGeom prst="straightConnector1">
-            <a:avLst/>
-          </a:prstGeom>
-          <a:ln w="12700">
-            <a:solidFill>
-              <a:schemeClr val="tx1"/>
-            </a:solidFill>
-            <a:tailEnd type="arrow"/>
-          </a:ln>
-        </p:spPr>
-        <p:style>
-          <a:lnRef idx="1">
-            <a:schemeClr val="accent1"/>
-          </a:lnRef>
-          <a:fillRef idx="0">
-            <a:schemeClr val="accent1"/>
-          </a:fillRef>
-          <a:effectRef idx="0">
-            <a:schemeClr val="accent1"/>
-          </a:effectRef>
-          <a:fontRef idx="minor">
-            <a:schemeClr val="tx1"/>
-          </a:fontRef>
-        </p:style>
-      </p:cxnSp>
-      <p:sp>
-        <p:nvSpPr>
-          <p:cNvPr id="101" name="ZoneTexte 100"/>
-          <p:cNvSpPr txBox="1"/>
-          <p:nvPr/>
-        </p:nvSpPr>
-        <p:spPr>
-          <a:xfrm>
-            <a:off x="7909347" y="1268760"/>
-            <a:ext cx="526106" cy="261610"/>
-          </a:xfrm>
-          <a:prstGeom prst="rect">
-            <a:avLst/>
-          </a:prstGeom>
-          <a:noFill/>
-        </p:spPr>
-        <p:txBody>
-          <a:bodyPr wrap="none" rtlCol="0">
-            <a:spAutoFit/>
-          </a:bodyPr>
-          <a:lstStyle/>
-          <a:p>
-            <a:r>
-              <a:rPr lang="fr-FR" sz="1100" dirty="0" smtClean="0"/>
-              <a:t>utilise</a:t>
-            </a:r>
-            <a:endParaRPr lang="fr-FR" sz="1100" dirty="0"/>
-          </a:p>
-        </p:txBody>
-      </p:sp>
-      <p:cxnSp>
-        <p:nvCxnSpPr>
-          <p:cNvPr id="27" name="Connecteur droit avec flèche 26"/>
-          <p:cNvCxnSpPr>
-            <a:stCxn id="11" idx="3"/>
-            <a:endCxn id="6" idx="1"/>
-          </p:cNvCxnSpPr>
-          <p:nvPr/>
-        </p:nvCxnSpPr>
-        <p:spPr>
-          <a:xfrm>
-            <a:off x="4541318" y="3384345"/>
-            <a:ext cx="1009494" cy="1954915"/>
-          </a:xfrm>
-          <a:prstGeom prst="straightConnector1">
-            <a:avLst/>
-          </a:prstGeom>
-          <a:ln w="12700">
-            <a:solidFill>
-              <a:schemeClr val="tx1"/>
-            </a:solidFill>
-            <a:tailEnd type="arrow"/>
-          </a:ln>
-        </p:spPr>
-        <p:style>
-          <a:lnRef idx="1">
-            <a:schemeClr val="accent1"/>
-          </a:lnRef>
-          <a:fillRef idx="0">
-            <a:schemeClr val="accent1"/>
-          </a:fillRef>
-          <a:effectRef idx="0">
-            <a:schemeClr val="accent1"/>
-          </a:effectRef>
-          <a:fontRef idx="minor">
-            <a:schemeClr val="tx1"/>
-          </a:fontRef>
-        </p:style>
-      </p:cxnSp>
-      <p:sp>
-        <p:nvSpPr>
-          <p:cNvPr id="31" name="ZoneTexte 30"/>
-          <p:cNvSpPr txBox="1"/>
-          <p:nvPr/>
-        </p:nvSpPr>
-        <p:spPr>
-          <a:xfrm>
-            <a:off x="6995826" y="4008355"/>
-            <a:ext cx="1440160" cy="648072"/>
-          </a:xfrm>
-          <a:prstGeom prst="rect">
-            <a:avLst/>
-          </a:prstGeom>
-          <a:gradFill>
-            <a:gsLst>
-              <a:gs pos="0">
-                <a:srgbClr val="E1E8F5"/>
-              </a:gs>
-              <a:gs pos="50000">
-                <a:srgbClr val="E8EEF8"/>
-              </a:gs>
-              <a:gs pos="100000">
-                <a:schemeClr val="accent1">
-                  <a:tint val="23500"/>
-                  <a:satMod val="160000"/>
-                </a:schemeClr>
-              </a:gs>
-            </a:gsLst>
-            <a:lin ang="5400000" scaled="0"/>
-          </a:gradFill>
-          <a:ln>
-            <a:solidFill>
-              <a:schemeClr val="accent1"/>
-            </a:solidFill>
-          </a:ln>
-          <a:effectLst>
-            <a:outerShdw blurRad="50800" dist="38100" dir="2700000" algn="tl" rotWithShape="0">
-              <a:prstClr val="black">
-                <a:alpha val="40000"/>
-              </a:prstClr>
-            </a:outerShdw>
-          </a:effectLst>
-        </p:spPr>
-        <p:txBody>
-          <a:bodyPr wrap="square" rtlCol="0" anchor="ctr" anchorCtr="1">
-            <a:noAutofit/>
-          </a:bodyPr>
-          <a:lstStyle/>
-          <a:p>
-            <a:pPr algn="ctr"/>
-            <a:r>
-              <a:rPr lang="fr-FR" dirty="0" smtClean="0"/>
-              <a:t>EXPORT</a:t>
-            </a:r>
-            <a:endParaRPr lang="fr-FR" dirty="0"/>
-          </a:p>
-        </p:txBody>
-      </p:sp>
-      <p:cxnSp>
-        <p:nvCxnSpPr>
-          <p:cNvPr id="41" name="Connecteur droit avec flèche 40"/>
-          <p:cNvCxnSpPr>
-            <a:stCxn id="31" idx="2"/>
-            <a:endCxn id="6" idx="3"/>
-          </p:cNvCxnSpPr>
-          <p:nvPr/>
-        </p:nvCxnSpPr>
-        <p:spPr>
-          <a:xfrm flipH="1">
-            <a:off x="6990972" y="4656427"/>
-            <a:ext cx="724934" cy="682833"/>
-          </a:xfrm>
-          <a:prstGeom prst="straightConnector1">
+          <a:xfrm rot="10800000">
+            <a:off x="4283259" y="2485038"/>
+            <a:ext cx="3216790" cy="385971"/>
+          </a:xfrm>
+          <a:prstGeom prst="curvedConnector2">
             <a:avLst/>
           </a:prstGeom>
           <a:ln w="12700">
@@ -4876,6 +5183,115 @@
     <p:extLst>
       <p:ext uri="{BB962C8B-B14F-4D97-AF65-F5344CB8AC3E}">
         <p14:creationId xmlns:p14="http://schemas.microsoft.com/office/powerpoint/2010/main" val="1947973820"/>
+      </p:ext>
+    </p:extLst>
+  </p:cSld>
+  <p:clrMapOvr>
+    <a:masterClrMapping/>
+  </p:clrMapOvr>
+</p:sld>
+</file>
+
+<file path=ppt/slides/slide2.xml><?xml version="1.0" encoding="utf-8"?>
+<p:sld xmlns:a="http://schemas.openxmlformats.org/drawingml/2006/main" xmlns:r="http://schemas.openxmlformats.org/officeDocument/2006/relationships" xmlns:p="http://schemas.openxmlformats.org/presentationml/2006/main">
+  <p:cSld>
+    <p:spTree>
+      <p:nvGrpSpPr>
+        <p:cNvPr id="1" name=""/>
+        <p:cNvGrpSpPr/>
+        <p:nvPr/>
+      </p:nvGrpSpPr>
+      <p:grpSpPr>
+        <a:xfrm>
+          <a:off x="0" y="0"/>
+          <a:ext cx="0" cy="0"/>
+          <a:chOff x="0" y="0"/>
+          <a:chExt cx="0" cy="0"/>
+        </a:xfrm>
+      </p:grpSpPr>
+      <p:sp>
+        <p:nvSpPr>
+          <p:cNvPr id="3" name="Espace réservé du contenu 2"/>
+          <p:cNvSpPr>
+            <a:spLocks noGrp="1"/>
+          </p:cNvSpPr>
+          <p:nvPr>
+            <p:ph idx="1"/>
+          </p:nvPr>
+        </p:nvSpPr>
+        <p:spPr>
+          <a:xfrm>
+            <a:off x="457200" y="692696"/>
+            <a:ext cx="8229600" cy="4525963"/>
+          </a:xfrm>
+        </p:spPr>
+        <p:txBody>
+          <a:bodyPr>
+            <a:normAutofit/>
+          </a:bodyPr>
+          <a:lstStyle/>
+          <a:p>
+            <a:endParaRPr lang="fr-FR" sz="1800" dirty="0"/>
+          </a:p>
+        </p:txBody>
+      </p:sp>
+      <p:sp>
+        <p:nvSpPr>
+          <p:cNvPr id="4" name="ZoneTexte 3"/>
+          <p:cNvSpPr txBox="1"/>
+          <p:nvPr/>
+        </p:nvSpPr>
+        <p:spPr>
+          <a:xfrm>
+            <a:off x="0" y="0"/>
+            <a:ext cx="9144000" cy="461665"/>
+          </a:xfrm>
+          <a:prstGeom prst="rect">
+            <a:avLst/>
+          </a:prstGeom>
+          <a:gradFill>
+            <a:gsLst>
+              <a:gs pos="0">
+                <a:schemeClr val="accent6">
+                  <a:lumMod val="60000"/>
+                  <a:lumOff val="40000"/>
+                </a:schemeClr>
+              </a:gs>
+              <a:gs pos="100000">
+                <a:schemeClr val="accent6">
+                  <a:lumMod val="20000"/>
+                  <a:lumOff val="80000"/>
+                </a:schemeClr>
+              </a:gs>
+            </a:gsLst>
+            <a:lin ang="5400000" scaled="0"/>
+          </a:gradFill>
+          <a:ln>
+            <a:solidFill>
+              <a:schemeClr val="accent6">
+                <a:lumMod val="75000"/>
+              </a:schemeClr>
+            </a:solidFill>
+          </a:ln>
+        </p:spPr>
+        <p:txBody>
+          <a:bodyPr wrap="square" rtlCol="0">
+            <a:spAutoFit/>
+          </a:bodyPr>
+          <a:lstStyle/>
+          <a:p>
+            <a:r>
+              <a:rPr lang="fr-FR" sz="2400" dirty="0" smtClean="0"/>
+              <a:t>LIBS UTILISEES</a:t>
+            </a:r>
+            <a:endParaRPr lang="fr-FR" sz="2400" dirty="0"/>
+          </a:p>
+        </p:txBody>
+      </p:sp>
+    </p:spTree>
+    <p:extLst>
+      <p:ext uri="{BB962C8B-B14F-4D97-AF65-F5344CB8AC3E}">
+        <p14:creationId xmlns:p14="http://schemas.microsoft.com/office/powerpoint/2010/main" val="117156479"/>
       </p:ext>
     </p:extLst>
   </p:cSld>

</xml_diff>